<commit_message>
desenho de solução ppt @kiviaaraujobandtec
</commit_message>
<xml_diff>
--- a/Documentação/Apresentação3Sprint.pptx
+++ b/Documentação/Apresentação3Sprint.pptx
@@ -282,7 +282,7 @@
           <a:p>
             <a:fld id="{4E1D7DE6-BA82-4080-9BA9-142B4E704EBC}" type="datetimeFigureOut">
               <a:rPr lang="pt-BR" smtClean="0"/>
-              <a:t>04/12/2019</a:t>
+              <a:t>05/12/2019</a:t>
             </a:fld>
             <a:endParaRPr lang="pt-BR"/>
           </a:p>
@@ -336,7 +336,7 @@
           <a:p>
             <a:fld id="{B6595F17-F1EC-4E10-BCA6-BAE260CB0777}" type="slidenum">
               <a:rPr lang="pt-BR" smtClean="0"/>
-              <a:t>‹nº›</a:t>
+              <a:t>‹#›</a:t>
             </a:fld>
             <a:endParaRPr lang="pt-BR"/>
           </a:p>
@@ -480,7 +480,7 @@
           <a:p>
             <a:fld id="{4E1D7DE6-BA82-4080-9BA9-142B4E704EBC}" type="datetimeFigureOut">
               <a:rPr lang="pt-BR" smtClean="0"/>
-              <a:t>04/12/2019</a:t>
+              <a:t>05/12/2019</a:t>
             </a:fld>
             <a:endParaRPr lang="pt-BR"/>
           </a:p>
@@ -534,7 +534,7 @@
           <a:p>
             <a:fld id="{B6595F17-F1EC-4E10-BCA6-BAE260CB0777}" type="slidenum">
               <a:rPr lang="pt-BR" smtClean="0"/>
-              <a:t>‹nº›</a:t>
+              <a:t>‹#›</a:t>
             </a:fld>
             <a:endParaRPr lang="pt-BR"/>
           </a:p>
@@ -688,7 +688,7 @@
           <a:p>
             <a:fld id="{4E1D7DE6-BA82-4080-9BA9-142B4E704EBC}" type="datetimeFigureOut">
               <a:rPr lang="pt-BR" smtClean="0"/>
-              <a:t>04/12/2019</a:t>
+              <a:t>05/12/2019</a:t>
             </a:fld>
             <a:endParaRPr lang="pt-BR"/>
           </a:p>
@@ -742,7 +742,7 @@
           <a:p>
             <a:fld id="{B6595F17-F1EC-4E10-BCA6-BAE260CB0777}" type="slidenum">
               <a:rPr lang="pt-BR" smtClean="0"/>
-              <a:t>‹nº›</a:t>
+              <a:t>‹#›</a:t>
             </a:fld>
             <a:endParaRPr lang="pt-BR"/>
           </a:p>
@@ -886,7 +886,7 @@
           <a:p>
             <a:fld id="{4E1D7DE6-BA82-4080-9BA9-142B4E704EBC}" type="datetimeFigureOut">
               <a:rPr lang="pt-BR" smtClean="0"/>
-              <a:t>04/12/2019</a:t>
+              <a:t>05/12/2019</a:t>
             </a:fld>
             <a:endParaRPr lang="pt-BR"/>
           </a:p>
@@ -940,7 +940,7 @@
           <a:p>
             <a:fld id="{B6595F17-F1EC-4E10-BCA6-BAE260CB0777}" type="slidenum">
               <a:rPr lang="pt-BR" smtClean="0"/>
-              <a:t>‹nº›</a:t>
+              <a:t>‹#›</a:t>
             </a:fld>
             <a:endParaRPr lang="pt-BR"/>
           </a:p>
@@ -1161,7 +1161,7 @@
           <a:p>
             <a:fld id="{4E1D7DE6-BA82-4080-9BA9-142B4E704EBC}" type="datetimeFigureOut">
               <a:rPr lang="pt-BR" smtClean="0"/>
-              <a:t>04/12/2019</a:t>
+              <a:t>05/12/2019</a:t>
             </a:fld>
             <a:endParaRPr lang="pt-BR"/>
           </a:p>
@@ -1215,7 +1215,7 @@
           <a:p>
             <a:fld id="{B6595F17-F1EC-4E10-BCA6-BAE260CB0777}" type="slidenum">
               <a:rPr lang="pt-BR" smtClean="0"/>
-              <a:t>‹nº›</a:t>
+              <a:t>‹#›</a:t>
             </a:fld>
             <a:endParaRPr lang="pt-BR"/>
           </a:p>
@@ -1426,7 +1426,7 @@
           <a:p>
             <a:fld id="{4E1D7DE6-BA82-4080-9BA9-142B4E704EBC}" type="datetimeFigureOut">
               <a:rPr lang="pt-BR" smtClean="0"/>
-              <a:t>04/12/2019</a:t>
+              <a:t>05/12/2019</a:t>
             </a:fld>
             <a:endParaRPr lang="pt-BR"/>
           </a:p>
@@ -1480,7 +1480,7 @@
           <a:p>
             <a:fld id="{B6595F17-F1EC-4E10-BCA6-BAE260CB0777}" type="slidenum">
               <a:rPr lang="pt-BR" smtClean="0"/>
-              <a:t>‹nº›</a:t>
+              <a:t>‹#›</a:t>
             </a:fld>
             <a:endParaRPr lang="pt-BR"/>
           </a:p>
@@ -1838,7 +1838,7 @@
           <a:p>
             <a:fld id="{4E1D7DE6-BA82-4080-9BA9-142B4E704EBC}" type="datetimeFigureOut">
               <a:rPr lang="pt-BR" smtClean="0"/>
-              <a:t>04/12/2019</a:t>
+              <a:t>05/12/2019</a:t>
             </a:fld>
             <a:endParaRPr lang="pt-BR"/>
           </a:p>
@@ -1892,7 +1892,7 @@
           <a:p>
             <a:fld id="{B6595F17-F1EC-4E10-BCA6-BAE260CB0777}" type="slidenum">
               <a:rPr lang="pt-BR" smtClean="0"/>
-              <a:t>‹nº›</a:t>
+              <a:t>‹#›</a:t>
             </a:fld>
             <a:endParaRPr lang="pt-BR"/>
           </a:p>
@@ -1979,7 +1979,7 @@
           <a:p>
             <a:fld id="{4E1D7DE6-BA82-4080-9BA9-142B4E704EBC}" type="datetimeFigureOut">
               <a:rPr lang="pt-BR" smtClean="0"/>
-              <a:t>04/12/2019</a:t>
+              <a:t>05/12/2019</a:t>
             </a:fld>
             <a:endParaRPr lang="pt-BR"/>
           </a:p>
@@ -2033,7 +2033,7 @@
           <a:p>
             <a:fld id="{B6595F17-F1EC-4E10-BCA6-BAE260CB0777}" type="slidenum">
               <a:rPr lang="pt-BR" smtClean="0"/>
-              <a:t>‹nº›</a:t>
+              <a:t>‹#›</a:t>
             </a:fld>
             <a:endParaRPr lang="pt-BR"/>
           </a:p>
@@ -2092,7 +2092,7 @@
           <a:p>
             <a:fld id="{4E1D7DE6-BA82-4080-9BA9-142B4E704EBC}" type="datetimeFigureOut">
               <a:rPr lang="pt-BR" smtClean="0"/>
-              <a:t>04/12/2019</a:t>
+              <a:t>05/12/2019</a:t>
             </a:fld>
             <a:endParaRPr lang="pt-BR"/>
           </a:p>
@@ -2146,7 +2146,7 @@
           <a:p>
             <a:fld id="{B6595F17-F1EC-4E10-BCA6-BAE260CB0777}" type="slidenum">
               <a:rPr lang="pt-BR" smtClean="0"/>
-              <a:t>‹nº›</a:t>
+              <a:t>‹#›</a:t>
             </a:fld>
             <a:endParaRPr lang="pt-BR"/>
           </a:p>
@@ -2403,7 +2403,7 @@
           <a:p>
             <a:fld id="{4E1D7DE6-BA82-4080-9BA9-142B4E704EBC}" type="datetimeFigureOut">
               <a:rPr lang="pt-BR" smtClean="0"/>
-              <a:t>04/12/2019</a:t>
+              <a:t>05/12/2019</a:t>
             </a:fld>
             <a:endParaRPr lang="pt-BR"/>
           </a:p>
@@ -2457,7 +2457,7 @@
           <a:p>
             <a:fld id="{B6595F17-F1EC-4E10-BCA6-BAE260CB0777}" type="slidenum">
               <a:rPr lang="pt-BR" smtClean="0"/>
-              <a:t>‹nº›</a:t>
+              <a:t>‹#›</a:t>
             </a:fld>
             <a:endParaRPr lang="pt-BR"/>
           </a:p>
@@ -2691,7 +2691,7 @@
           <a:p>
             <a:fld id="{4E1D7DE6-BA82-4080-9BA9-142B4E704EBC}" type="datetimeFigureOut">
               <a:rPr lang="pt-BR" smtClean="0"/>
-              <a:t>04/12/2019</a:t>
+              <a:t>05/12/2019</a:t>
             </a:fld>
             <a:endParaRPr lang="pt-BR"/>
           </a:p>
@@ -2745,7 +2745,7 @@
           <a:p>
             <a:fld id="{B6595F17-F1EC-4E10-BCA6-BAE260CB0777}" type="slidenum">
               <a:rPr lang="pt-BR" smtClean="0"/>
-              <a:t>‹nº›</a:t>
+              <a:t>‹#›</a:t>
             </a:fld>
             <a:endParaRPr lang="pt-BR"/>
           </a:p>
@@ -2932,7 +2932,7 @@
           <a:p>
             <a:fld id="{4E1D7DE6-BA82-4080-9BA9-142B4E704EBC}" type="datetimeFigureOut">
               <a:rPr lang="pt-BR" smtClean="0"/>
-              <a:t>04/12/2019</a:t>
+              <a:t>05/12/2019</a:t>
             </a:fld>
             <a:endParaRPr lang="pt-BR"/>
           </a:p>
@@ -3022,7 +3022,7 @@
           <a:p>
             <a:fld id="{B6595F17-F1EC-4E10-BCA6-BAE260CB0777}" type="slidenum">
               <a:rPr lang="pt-BR" smtClean="0"/>
-              <a:t>‹nº›</a:t>
+              <a:t>‹#›</a:t>
             </a:fld>
             <a:endParaRPr lang="pt-BR"/>
           </a:p>
@@ -3407,13 +3407,6 @@
   <p:clrMapOvr>
     <a:masterClrMapping/>
   </p:clrMapOvr>
-  <p:timing>
-    <p:tnLst>
-      <p:par>
-        <p:cTn id="1" dur="indefinite" restart="never" nodeType="tmRoot"/>
-      </p:par>
-    </p:tnLst>
-  </p:timing>
 </p:sld>
 </file>
 
@@ -3516,13 +3509,6 @@
   <p:clrMapOvr>
     <a:masterClrMapping/>
   </p:clrMapOvr>
-  <p:timing>
-    <p:tnLst>
-      <p:par>
-        <p:cTn id="1" dur="indefinite" restart="never" nodeType="tmRoot"/>
-      </p:par>
-    </p:tnLst>
-  </p:timing>
 </p:sld>
 </file>
 
@@ -3601,13 +3587,6 @@
   <p:clrMapOvr>
     <a:masterClrMapping/>
   </p:clrMapOvr>
-  <p:timing>
-    <p:tnLst>
-      <p:par>
-        <p:cTn id="1" dur="indefinite" restart="never" nodeType="tmRoot"/>
-      </p:par>
-    </p:tnLst>
-  </p:timing>
 </p:sld>
 </file>
 
@@ -3686,13 +3665,6 @@
   <p:clrMapOvr>
     <a:masterClrMapping/>
   </p:clrMapOvr>
-  <p:timing>
-    <p:tnLst>
-      <p:par>
-        <p:cTn id="1" dur="indefinite" restart="never" nodeType="tmRoot"/>
-      </p:par>
-    </p:tnLst>
-  </p:timing>
 </p:sld>
 </file>
 
@@ -3771,13 +3743,6 @@
   <p:clrMapOvr>
     <a:masterClrMapping/>
   </p:clrMapOvr>
-  <p:timing>
-    <p:tnLst>
-      <p:par>
-        <p:cTn id="1" dur="indefinite" restart="never" nodeType="tmRoot"/>
-      </p:par>
-    </p:tnLst>
-  </p:timing>
 </p:sld>
 </file>
 
@@ -3886,13 +3851,6 @@
   <p:clrMapOvr>
     <a:masterClrMapping/>
   </p:clrMapOvr>
-  <p:timing>
-    <p:tnLst>
-      <p:par>
-        <p:cTn id="1" dur="indefinite" restart="never" nodeType="tmRoot"/>
-      </p:par>
-    </p:tnLst>
-  </p:timing>
 </p:sld>
 </file>
 
@@ -4001,13 +3959,6 @@
   <p:clrMapOvr>
     <a:masterClrMapping/>
   </p:clrMapOvr>
-  <p:timing>
-    <p:tnLst>
-      <p:par>
-        <p:cTn id="1" dur="indefinite" restart="never" nodeType="tmRoot"/>
-      </p:par>
-    </p:tnLst>
-  </p:timing>
 </p:sld>
 </file>
 
@@ -4116,13 +4067,6 @@
   <p:clrMapOvr>
     <a:masterClrMapping/>
   </p:clrMapOvr>
-  <p:timing>
-    <p:tnLst>
-      <p:par>
-        <p:cTn id="1" dur="indefinite" restart="never" nodeType="tmRoot"/>
-      </p:par>
-    </p:tnLst>
-  </p:timing>
 </p:sld>
 </file>
 
@@ -4377,13 +4321,6 @@
   <p:clrMapOvr>
     <a:masterClrMapping/>
   </p:clrMapOvr>
-  <p:timing>
-    <p:tnLst>
-      <p:par>
-        <p:cTn id="1" dur="indefinite" restart="never" nodeType="tmRoot"/>
-      </p:par>
-    </p:tnLst>
-  </p:timing>
 </p:sld>
 </file>
 
@@ -4462,13 +4399,6 @@
   <p:clrMapOvr>
     <a:masterClrMapping/>
   </p:clrMapOvr>
-  <p:timing>
-    <p:tnLst>
-      <p:par>
-        <p:cTn id="1" dur="indefinite" restart="never" nodeType="tmRoot"/>
-      </p:par>
-    </p:tnLst>
-  </p:timing>
 </p:sld>
 </file>
 
@@ -4547,13 +4477,6 @@
   <p:clrMapOvr>
     <a:masterClrMapping/>
   </p:clrMapOvr>
-  <p:timing>
-    <p:tnLst>
-      <p:par>
-        <p:cTn id="1" dur="indefinite" restart="never" nodeType="tmRoot"/>
-      </p:par>
-    </p:tnLst>
-  </p:timing>
 </p:sld>
 </file>
 
@@ -4632,13 +4555,6 @@
   <p:clrMapOvr>
     <a:masterClrMapping/>
   </p:clrMapOvr>
-  <p:timing>
-    <p:tnLst>
-      <p:par>
-        <p:cTn id="1" dur="indefinite" restart="never" nodeType="tmRoot"/>
-      </p:par>
-    </p:tnLst>
-  </p:timing>
 </p:sld>
 </file>
 
@@ -4741,13 +4657,6 @@
   <p:clrMapOvr>
     <a:masterClrMapping/>
   </p:clrMapOvr>
-  <p:timing>
-    <p:tnLst>
-      <p:par>
-        <p:cTn id="1" dur="indefinite" restart="never" nodeType="tmRoot"/>
-      </p:par>
-    </p:tnLst>
-  </p:timing>
 </p:sld>
 </file>
 
@@ -4826,13 +4735,6 @@
   <p:clrMapOvr>
     <a:masterClrMapping/>
   </p:clrMapOvr>
-  <p:timing>
-    <p:tnLst>
-      <p:par>
-        <p:cTn id="1" dur="indefinite" restart="never" nodeType="tmRoot"/>
-      </p:par>
-    </p:tnLst>
-  </p:timing>
 </p:sld>
 </file>
 
@@ -4911,13 +4813,6 @@
   <p:clrMapOvr>
     <a:masterClrMapping/>
   </p:clrMapOvr>
-  <p:timing>
-    <p:tnLst>
-      <p:par>
-        <p:cTn id="1" dur="indefinite" restart="never" nodeType="tmRoot"/>
-      </p:par>
-    </p:tnLst>
-  </p:timing>
 </p:sld>
 </file>
 
@@ -4996,13 +4891,6 @@
   <p:clrMapOvr>
     <a:masterClrMapping/>
   </p:clrMapOvr>
-  <p:timing>
-    <p:tnLst>
-      <p:par>
-        <p:cTn id="1" dur="indefinite" restart="never" nodeType="tmRoot"/>
-      </p:par>
-    </p:tnLst>
-  </p:timing>
 </p:sld>
 </file>
 
@@ -5081,13 +4969,6 @@
   <p:clrMapOvr>
     <a:masterClrMapping/>
   </p:clrMapOvr>
-  <p:timing>
-    <p:tnLst>
-      <p:par>
-        <p:cTn id="1" dur="indefinite" restart="never" nodeType="tmRoot"/>
-      </p:par>
-    </p:tnLst>
-  </p:timing>
 </p:sld>
 </file>
 
@@ -5166,13 +5047,6 @@
   <p:clrMapOvr>
     <a:masterClrMapping/>
   </p:clrMapOvr>
-  <p:timing>
-    <p:tnLst>
-      <p:par>
-        <p:cTn id="1" dur="indefinite" restart="never" nodeType="tmRoot"/>
-      </p:par>
-    </p:tnLst>
-  </p:timing>
 </p:sld>
 </file>
 
@@ -5251,13 +5125,6 @@
   <p:clrMapOvr>
     <a:masterClrMapping/>
   </p:clrMapOvr>
-  <p:timing>
-    <p:tnLst>
-      <p:par>
-        <p:cTn id="1" dur="indefinite" restart="never" nodeType="tmRoot"/>
-      </p:par>
-    </p:tnLst>
-  </p:timing>
 </p:sld>
 </file>
 
@@ -5326,6 +5193,36 @@
           </a:xfrm>
         </p:spPr>
       </p:pic>
+      <p:pic>
+        <p:nvPicPr>
+          <p:cNvPr id="3" name="Picture 2">
+            <a:extLst>
+              <a:ext uri="{FF2B5EF4-FFF2-40B4-BE49-F238E27FC236}">
+                <a16:creationId xmlns:a16="http://schemas.microsoft.com/office/drawing/2014/main" id="{18C4B29B-77DA-4BA0-897B-4980CE3ED05F}"/>
+              </a:ext>
+            </a:extLst>
+          </p:cNvPr>
+          <p:cNvPicPr>
+            <a:picLocks noChangeAspect="1"/>
+          </p:cNvPicPr>
+          <p:nvPr/>
+        </p:nvPicPr>
+        <p:blipFill>
+          <a:blip r:embed="rId3"/>
+          <a:stretch>
+            <a:fillRect/>
+          </a:stretch>
+        </p:blipFill>
+        <p:spPr>
+          <a:xfrm>
+            <a:off x="5152804" y="1253026"/>
+            <a:ext cx="6853666" cy="4351948"/>
+          </a:xfrm>
+          <a:prstGeom prst="rect">
+            <a:avLst/>
+          </a:prstGeom>
+        </p:spPr>
+      </p:pic>
     </p:spTree>
     <p:extLst>
       <p:ext uri="{BB962C8B-B14F-4D97-AF65-F5344CB8AC3E}">
@@ -5336,13 +5233,6 @@
   <p:clrMapOvr>
     <a:masterClrMapping/>
   </p:clrMapOvr>
-  <p:timing>
-    <p:tnLst>
-      <p:par>
-        <p:cTn id="1" dur="indefinite" restart="never" nodeType="tmRoot"/>
-      </p:par>
-    </p:tnLst>
-  </p:timing>
 </p:sld>
 </file>
 
@@ -5421,13 +5311,6 @@
   <p:clrMapOvr>
     <a:masterClrMapping/>
   </p:clrMapOvr>
-  <p:timing>
-    <p:tnLst>
-      <p:par>
-        <p:cTn id="1" dur="indefinite" restart="never" nodeType="tmRoot"/>
-      </p:par>
-    </p:tnLst>
-  </p:timing>
 </p:sld>
 </file>
 
@@ -5530,13 +5413,6 @@
   <p:clrMapOvr>
     <a:masterClrMapping/>
   </p:clrMapOvr>
-  <p:timing>
-    <p:tnLst>
-      <p:par>
-        <p:cTn id="1" dur="indefinite" restart="never" nodeType="tmRoot"/>
-      </p:par>
-    </p:tnLst>
-  </p:timing>
 </p:sld>
 </file>
 
@@ -5639,13 +5515,6 @@
   <p:clrMapOvr>
     <a:masterClrMapping/>
   </p:clrMapOvr>
-  <p:timing>
-    <p:tnLst>
-      <p:par>
-        <p:cTn id="1" dur="indefinite" restart="never" nodeType="tmRoot"/>
-      </p:par>
-    </p:tnLst>
-  </p:timing>
 </p:sld>
 </file>
 

</xml_diff>

<commit_message>
desenho de solução @kiviaaraujobandtec
</commit_message>
<xml_diff>
--- a/Documentação/Apresentação3Sprint.pptx
+++ b/Documentação/Apresentação3Sprint.pptx
@@ -336,7 +336,7 @@
           <a:p>
             <a:fld id="{B6595F17-F1EC-4E10-BCA6-BAE260CB0777}" type="slidenum">
               <a:rPr lang="pt-BR" smtClean="0"/>
-              <a:t>‹#›</a:t>
+              <a:t>‹nº›</a:t>
             </a:fld>
             <a:endParaRPr lang="pt-BR"/>
           </a:p>
@@ -534,7 +534,7 @@
           <a:p>
             <a:fld id="{B6595F17-F1EC-4E10-BCA6-BAE260CB0777}" type="slidenum">
               <a:rPr lang="pt-BR" smtClean="0"/>
-              <a:t>‹#›</a:t>
+              <a:t>‹nº›</a:t>
             </a:fld>
             <a:endParaRPr lang="pt-BR"/>
           </a:p>
@@ -742,7 +742,7 @@
           <a:p>
             <a:fld id="{B6595F17-F1EC-4E10-BCA6-BAE260CB0777}" type="slidenum">
               <a:rPr lang="pt-BR" smtClean="0"/>
-              <a:t>‹#›</a:t>
+              <a:t>‹nº›</a:t>
             </a:fld>
             <a:endParaRPr lang="pt-BR"/>
           </a:p>
@@ -940,7 +940,7 @@
           <a:p>
             <a:fld id="{B6595F17-F1EC-4E10-BCA6-BAE260CB0777}" type="slidenum">
               <a:rPr lang="pt-BR" smtClean="0"/>
-              <a:t>‹#›</a:t>
+              <a:t>‹nº›</a:t>
             </a:fld>
             <a:endParaRPr lang="pt-BR"/>
           </a:p>
@@ -1215,7 +1215,7 @@
           <a:p>
             <a:fld id="{B6595F17-F1EC-4E10-BCA6-BAE260CB0777}" type="slidenum">
               <a:rPr lang="pt-BR" smtClean="0"/>
-              <a:t>‹#›</a:t>
+              <a:t>‹nº›</a:t>
             </a:fld>
             <a:endParaRPr lang="pt-BR"/>
           </a:p>
@@ -1480,7 +1480,7 @@
           <a:p>
             <a:fld id="{B6595F17-F1EC-4E10-BCA6-BAE260CB0777}" type="slidenum">
               <a:rPr lang="pt-BR" smtClean="0"/>
-              <a:t>‹#›</a:t>
+              <a:t>‹nº›</a:t>
             </a:fld>
             <a:endParaRPr lang="pt-BR"/>
           </a:p>
@@ -1892,7 +1892,7 @@
           <a:p>
             <a:fld id="{B6595F17-F1EC-4E10-BCA6-BAE260CB0777}" type="slidenum">
               <a:rPr lang="pt-BR" smtClean="0"/>
-              <a:t>‹#›</a:t>
+              <a:t>‹nº›</a:t>
             </a:fld>
             <a:endParaRPr lang="pt-BR"/>
           </a:p>
@@ -2033,7 +2033,7 @@
           <a:p>
             <a:fld id="{B6595F17-F1EC-4E10-BCA6-BAE260CB0777}" type="slidenum">
               <a:rPr lang="pt-BR" smtClean="0"/>
-              <a:t>‹#›</a:t>
+              <a:t>‹nº›</a:t>
             </a:fld>
             <a:endParaRPr lang="pt-BR"/>
           </a:p>
@@ -2146,7 +2146,7 @@
           <a:p>
             <a:fld id="{B6595F17-F1EC-4E10-BCA6-BAE260CB0777}" type="slidenum">
               <a:rPr lang="pt-BR" smtClean="0"/>
-              <a:t>‹#›</a:t>
+              <a:t>‹nº›</a:t>
             </a:fld>
             <a:endParaRPr lang="pt-BR"/>
           </a:p>
@@ -2457,7 +2457,7 @@
           <a:p>
             <a:fld id="{B6595F17-F1EC-4E10-BCA6-BAE260CB0777}" type="slidenum">
               <a:rPr lang="pt-BR" smtClean="0"/>
-              <a:t>‹#›</a:t>
+              <a:t>‹nº›</a:t>
             </a:fld>
             <a:endParaRPr lang="pt-BR"/>
           </a:p>
@@ -2745,7 +2745,7 @@
           <a:p>
             <a:fld id="{B6595F17-F1EC-4E10-BCA6-BAE260CB0777}" type="slidenum">
               <a:rPr lang="pt-BR" smtClean="0"/>
-              <a:t>‹#›</a:t>
+              <a:t>‹nº›</a:t>
             </a:fld>
             <a:endParaRPr lang="pt-BR"/>
           </a:p>
@@ -3022,7 +3022,7 @@
           <a:p>
             <a:fld id="{B6595F17-F1EC-4E10-BCA6-BAE260CB0777}" type="slidenum">
               <a:rPr lang="pt-BR" smtClean="0"/>
-              <a:t>‹#›</a:t>
+              <a:t>‹nº›</a:t>
             </a:fld>
             <a:endParaRPr lang="pt-BR"/>
           </a:p>
@@ -5125,6 +5125,13 @@
   <p:clrMapOvr>
     <a:masterClrMapping/>
   </p:clrMapOvr>
+  <p:timing>
+    <p:tnLst>
+      <p:par>
+        <p:cTn id="1" dur="indefinite" restart="never" nodeType="tmRoot"/>
+      </p:par>
+    </p:tnLst>
+  </p:timing>
 </p:sld>
 </file>
 
@@ -5195,13 +5202,7 @@
       </p:pic>
       <p:pic>
         <p:nvPicPr>
-          <p:cNvPr id="3" name="Picture 2">
-            <a:extLst>
-              <a:ext uri="{FF2B5EF4-FFF2-40B4-BE49-F238E27FC236}">
-                <a16:creationId xmlns:a16="http://schemas.microsoft.com/office/drawing/2014/main" id="{18C4B29B-77DA-4BA0-897B-4980CE3ED05F}"/>
-              </a:ext>
-            </a:extLst>
-          </p:cNvPr>
+          <p:cNvPr id="5" name="Imagem 4"/>
           <p:cNvPicPr>
             <a:picLocks noChangeAspect="1"/>
           </p:cNvPicPr>
@@ -5215,8 +5216,8 @@
         </p:blipFill>
         <p:spPr>
           <a:xfrm>
-            <a:off x="5152804" y="1253026"/>
-            <a:ext cx="6853666" cy="4351948"/>
+            <a:off x="5187950" y="963325"/>
+            <a:ext cx="6838950" cy="4951699"/>
           </a:xfrm>
           <a:prstGeom prst="rect">
             <a:avLst/>
@@ -5233,6 +5234,13 @@
   <p:clrMapOvr>
     <a:masterClrMapping/>
   </p:clrMapOvr>
+  <p:timing>
+    <p:tnLst>
+      <p:par>
+        <p:cTn id="1" dur="indefinite" restart="never" nodeType="tmRoot"/>
+      </p:par>
+    </p:tnLst>
+  </p:timing>
 </p:sld>
 </file>
 
@@ -5311,6 +5319,13 @@
   <p:clrMapOvr>
     <a:masterClrMapping/>
   </p:clrMapOvr>
+  <p:timing>
+    <p:tnLst>
+      <p:par>
+        <p:cTn id="1" dur="indefinite" restart="never" nodeType="tmRoot"/>
+      </p:par>
+    </p:tnLst>
+  </p:timing>
 </p:sld>
 </file>
 

</xml_diff>

<commit_message>
desenho de solução atualizado @kiviaaraujobandtec
</commit_message>
<xml_diff>
--- a/Documentação/Apresentação3Sprint.pptx
+++ b/Documentação/Apresentação3Sprint.pptx
@@ -282,7 +282,7 @@
           <a:p>
             <a:fld id="{4E1D7DE6-BA82-4080-9BA9-142B4E704EBC}" type="datetimeFigureOut">
               <a:rPr lang="pt-BR" smtClean="0"/>
-              <a:t>05/12/2019</a:t>
+              <a:t>06/12/2019</a:t>
             </a:fld>
             <a:endParaRPr lang="pt-BR"/>
           </a:p>
@@ -480,7 +480,7 @@
           <a:p>
             <a:fld id="{4E1D7DE6-BA82-4080-9BA9-142B4E704EBC}" type="datetimeFigureOut">
               <a:rPr lang="pt-BR" smtClean="0"/>
-              <a:t>05/12/2019</a:t>
+              <a:t>06/12/2019</a:t>
             </a:fld>
             <a:endParaRPr lang="pt-BR"/>
           </a:p>
@@ -688,7 +688,7 @@
           <a:p>
             <a:fld id="{4E1D7DE6-BA82-4080-9BA9-142B4E704EBC}" type="datetimeFigureOut">
               <a:rPr lang="pt-BR" smtClean="0"/>
-              <a:t>05/12/2019</a:t>
+              <a:t>06/12/2019</a:t>
             </a:fld>
             <a:endParaRPr lang="pt-BR"/>
           </a:p>
@@ -886,7 +886,7 @@
           <a:p>
             <a:fld id="{4E1D7DE6-BA82-4080-9BA9-142B4E704EBC}" type="datetimeFigureOut">
               <a:rPr lang="pt-BR" smtClean="0"/>
-              <a:t>05/12/2019</a:t>
+              <a:t>06/12/2019</a:t>
             </a:fld>
             <a:endParaRPr lang="pt-BR"/>
           </a:p>
@@ -1161,7 +1161,7 @@
           <a:p>
             <a:fld id="{4E1D7DE6-BA82-4080-9BA9-142B4E704EBC}" type="datetimeFigureOut">
               <a:rPr lang="pt-BR" smtClean="0"/>
-              <a:t>05/12/2019</a:t>
+              <a:t>06/12/2019</a:t>
             </a:fld>
             <a:endParaRPr lang="pt-BR"/>
           </a:p>
@@ -1426,7 +1426,7 @@
           <a:p>
             <a:fld id="{4E1D7DE6-BA82-4080-9BA9-142B4E704EBC}" type="datetimeFigureOut">
               <a:rPr lang="pt-BR" smtClean="0"/>
-              <a:t>05/12/2019</a:t>
+              <a:t>06/12/2019</a:t>
             </a:fld>
             <a:endParaRPr lang="pt-BR"/>
           </a:p>
@@ -1838,7 +1838,7 @@
           <a:p>
             <a:fld id="{4E1D7DE6-BA82-4080-9BA9-142B4E704EBC}" type="datetimeFigureOut">
               <a:rPr lang="pt-BR" smtClean="0"/>
-              <a:t>05/12/2019</a:t>
+              <a:t>06/12/2019</a:t>
             </a:fld>
             <a:endParaRPr lang="pt-BR"/>
           </a:p>
@@ -1979,7 +1979,7 @@
           <a:p>
             <a:fld id="{4E1D7DE6-BA82-4080-9BA9-142B4E704EBC}" type="datetimeFigureOut">
               <a:rPr lang="pt-BR" smtClean="0"/>
-              <a:t>05/12/2019</a:t>
+              <a:t>06/12/2019</a:t>
             </a:fld>
             <a:endParaRPr lang="pt-BR"/>
           </a:p>
@@ -2092,7 +2092,7 @@
           <a:p>
             <a:fld id="{4E1D7DE6-BA82-4080-9BA9-142B4E704EBC}" type="datetimeFigureOut">
               <a:rPr lang="pt-BR" smtClean="0"/>
-              <a:t>05/12/2019</a:t>
+              <a:t>06/12/2019</a:t>
             </a:fld>
             <a:endParaRPr lang="pt-BR"/>
           </a:p>
@@ -2403,7 +2403,7 @@
           <a:p>
             <a:fld id="{4E1D7DE6-BA82-4080-9BA9-142B4E704EBC}" type="datetimeFigureOut">
               <a:rPr lang="pt-BR" smtClean="0"/>
-              <a:t>05/12/2019</a:t>
+              <a:t>06/12/2019</a:t>
             </a:fld>
             <a:endParaRPr lang="pt-BR"/>
           </a:p>
@@ -2691,7 +2691,7 @@
           <a:p>
             <a:fld id="{4E1D7DE6-BA82-4080-9BA9-142B4E704EBC}" type="datetimeFigureOut">
               <a:rPr lang="pt-BR" smtClean="0"/>
-              <a:t>05/12/2019</a:t>
+              <a:t>06/12/2019</a:t>
             </a:fld>
             <a:endParaRPr lang="pt-BR"/>
           </a:p>
@@ -2932,7 +2932,7 @@
           <a:p>
             <a:fld id="{4E1D7DE6-BA82-4080-9BA9-142B4E704EBC}" type="datetimeFigureOut">
               <a:rPr lang="pt-BR" smtClean="0"/>
-              <a:t>05/12/2019</a:t>
+              <a:t>06/12/2019</a:t>
             </a:fld>
             <a:endParaRPr lang="pt-BR"/>
           </a:p>
@@ -5260,7 +5260,7 @@
       </p:pic>
       <p:pic>
         <p:nvPicPr>
-          <p:cNvPr id="5" name="Imagem 4"/>
+          <p:cNvPr id="7" name="Imagem 6"/>
           <p:cNvPicPr>
             <a:picLocks noChangeAspect="1"/>
           </p:cNvPicPr>
@@ -5274,8 +5274,8 @@
         </p:blipFill>
         <p:spPr>
           <a:xfrm>
-            <a:off x="5187950" y="963325"/>
-            <a:ext cx="6838950" cy="4951699"/>
+            <a:off x="5141188" y="1861365"/>
+            <a:ext cx="6915830" cy="3840476"/>
           </a:xfrm>
           <a:prstGeom prst="rect">
             <a:avLst/>

</xml_diff>

<commit_message>
desenho de solução && modelo logico
</commit_message>
<xml_diff>
--- a/Documentação/Apresentação3Sprint.pptx
+++ b/Documentação/Apresentação3Sprint.pptx
@@ -3963,7 +3963,7 @@
             <p:ph idx="1"/>
           </p:nvPr>
         </p:nvPicPr>
-        <p:blipFill>
+        <p:blipFill rotWithShape="1">
           <a:blip r:embed="rId2" cstate="print">
             <a:extLst>
               <a:ext uri="{28A0092B-C50C-407E-A947-70E740481C1C}">
@@ -3971,45 +3971,49 @@
               </a:ext>
             </a:extLst>
           </a:blip>
+          <a:srcRect b="73526"/>
+          <a:stretch/>
+        </p:blipFill>
+        <p:spPr>
+          <a:xfrm>
+            <a:off x="0" y="0"/>
+            <a:ext cx="12192000" cy="1815548"/>
+          </a:xfrm>
+        </p:spPr>
+      </p:pic>
+      <p:pic>
+        <p:nvPicPr>
+          <p:cNvPr id="6" name="Imagem 5">
+            <a:extLst>
+              <a:ext uri="{FF2B5EF4-FFF2-40B4-BE49-F238E27FC236}">
+                <a16:creationId xmlns:a16="http://schemas.microsoft.com/office/drawing/2014/main" id="{7AD9EBB3-6C72-4B4A-825F-1A4A005868EF}"/>
+              </a:ext>
+            </a:extLst>
+          </p:cNvPr>
+          <p:cNvPicPr>
+            <a:picLocks noChangeAspect="1"/>
+          </p:cNvPicPr>
+          <p:nvPr/>
+        </p:nvPicPr>
+        <p:blipFill>
+          <a:blip r:embed="rId3"/>
           <a:stretch>
             <a:fillRect/>
           </a:stretch>
         </p:blipFill>
         <p:spPr>
           <a:xfrm>
-            <a:off x="0" y="0"/>
-            <a:ext cx="12192000" cy="6858000"/>
-          </a:xfrm>
-        </p:spPr>
-      </p:pic>
-      <p:pic>
-        <p:nvPicPr>
-          <p:cNvPr id="5" name="Imagem 4"/>
-          <p:cNvPicPr>
-            <a:picLocks noChangeAspect="1"/>
-          </p:cNvPicPr>
-          <p:nvPr/>
-        </p:nvPicPr>
-        <p:blipFill>
-          <a:blip r:embed="rId3" cstate="print">
-            <a:extLst>
-              <a:ext uri="{28A0092B-C50C-407E-A947-70E740481C1C}">
-                <a14:useLocalDpi xmlns:a14="http://schemas.microsoft.com/office/drawing/2010/main" val="0"/>
-              </a:ext>
-            </a:extLst>
-          </a:blip>
-          <a:stretch>
-            <a:fillRect/>
-          </a:stretch>
-        </p:blipFill>
-        <p:spPr>
-          <a:xfrm>
-            <a:off x="2325188" y="1973910"/>
-            <a:ext cx="7862581" cy="4884090"/>
+            <a:off x="2511221" y="2075783"/>
+            <a:ext cx="6878010" cy="4782217"/>
           </a:xfrm>
           <a:prstGeom prst="rect">
             <a:avLst/>
           </a:prstGeom>
+          <a:ln>
+            <a:solidFill>
+              <a:srgbClr val="FFFFFF"/>
+            </a:solidFill>
+          </a:ln>
         </p:spPr>
       </p:pic>
     </p:spTree>
@@ -5054,7 +5058,13 @@
       </p:pic>
       <p:pic>
         <p:nvPicPr>
-          <p:cNvPr id="7" name="Imagem 6"/>
+          <p:cNvPr id="3" name="Imagem 2">
+            <a:extLst>
+              <a:ext uri="{FF2B5EF4-FFF2-40B4-BE49-F238E27FC236}">
+                <a16:creationId xmlns:a16="http://schemas.microsoft.com/office/drawing/2014/main" id="{83AB6790-9345-48BD-A0C3-FF7DA5F2CAF9}"/>
+              </a:ext>
+            </a:extLst>
+          </p:cNvPr>
           <p:cNvPicPr>
             <a:picLocks noChangeAspect="1"/>
           </p:cNvPicPr>
@@ -5068,8 +5078,8 @@
         </p:blipFill>
         <p:spPr>
           <a:xfrm>
-            <a:off x="5141188" y="1861365"/>
-            <a:ext cx="6915830" cy="3840476"/>
+            <a:off x="5172220" y="1226861"/>
+            <a:ext cx="6767990" cy="4670355"/>
           </a:xfrm>
           <a:prstGeom prst="rect">
             <a:avLst/>

</xml_diff>